<commit_message>
modif RWD dans le rapport
</commit_message>
<xml_diff>
--- a/Rapport/Imgs/Images dev.pptx
+++ b/Rapport/Imgs/Images dev.pptx
@@ -6,6 +6,7 @@
   </p:sldMasterIdLst>
   <p:sldIdLst>
     <p:sldId id="256" r:id="rId2"/>
+    <p:sldId id="257" r:id="rId3"/>
   </p:sldIdLst>
   <p:sldSz cx="12192000" cy="6858000"/>
   <p:notesSz cx="6858000" cy="9144000"/>
@@ -267,7 +268,7 @@
           <a:p>
             <a:fld id="{B13D75DC-8E41-4047-8660-F48B31ADAB0C}" type="datetimeFigureOut">
               <a:rPr lang="fr-FR" smtClean="0"/>
-              <a:t>21/03/2020</a:t>
+              <a:t>31/03/2020</a:t>
             </a:fld>
             <a:endParaRPr lang="fr-FR"/>
           </a:p>
@@ -465,7 +466,7 @@
           <a:p>
             <a:fld id="{B13D75DC-8E41-4047-8660-F48B31ADAB0C}" type="datetimeFigureOut">
               <a:rPr lang="fr-FR" smtClean="0"/>
-              <a:t>21/03/2020</a:t>
+              <a:t>31/03/2020</a:t>
             </a:fld>
             <a:endParaRPr lang="fr-FR"/>
           </a:p>
@@ -673,7 +674,7 @@
           <a:p>
             <a:fld id="{B13D75DC-8E41-4047-8660-F48B31ADAB0C}" type="datetimeFigureOut">
               <a:rPr lang="fr-FR" smtClean="0"/>
-              <a:t>21/03/2020</a:t>
+              <a:t>31/03/2020</a:t>
             </a:fld>
             <a:endParaRPr lang="fr-FR"/>
           </a:p>
@@ -871,7 +872,7 @@
           <a:p>
             <a:fld id="{B13D75DC-8E41-4047-8660-F48B31ADAB0C}" type="datetimeFigureOut">
               <a:rPr lang="fr-FR" smtClean="0"/>
-              <a:t>21/03/2020</a:t>
+              <a:t>31/03/2020</a:t>
             </a:fld>
             <a:endParaRPr lang="fr-FR"/>
           </a:p>
@@ -1146,7 +1147,7 @@
           <a:p>
             <a:fld id="{B13D75DC-8E41-4047-8660-F48B31ADAB0C}" type="datetimeFigureOut">
               <a:rPr lang="fr-FR" smtClean="0"/>
-              <a:t>21/03/2020</a:t>
+              <a:t>31/03/2020</a:t>
             </a:fld>
             <a:endParaRPr lang="fr-FR"/>
           </a:p>
@@ -1411,7 +1412,7 @@
           <a:p>
             <a:fld id="{B13D75DC-8E41-4047-8660-F48B31ADAB0C}" type="datetimeFigureOut">
               <a:rPr lang="fr-FR" smtClean="0"/>
-              <a:t>21/03/2020</a:t>
+              <a:t>31/03/2020</a:t>
             </a:fld>
             <a:endParaRPr lang="fr-FR"/>
           </a:p>
@@ -1823,7 +1824,7 @@
           <a:p>
             <a:fld id="{B13D75DC-8E41-4047-8660-F48B31ADAB0C}" type="datetimeFigureOut">
               <a:rPr lang="fr-FR" smtClean="0"/>
-              <a:t>21/03/2020</a:t>
+              <a:t>31/03/2020</a:t>
             </a:fld>
             <a:endParaRPr lang="fr-FR"/>
           </a:p>
@@ -1964,7 +1965,7 @@
           <a:p>
             <a:fld id="{B13D75DC-8E41-4047-8660-F48B31ADAB0C}" type="datetimeFigureOut">
               <a:rPr lang="fr-FR" smtClean="0"/>
-              <a:t>21/03/2020</a:t>
+              <a:t>31/03/2020</a:t>
             </a:fld>
             <a:endParaRPr lang="fr-FR"/>
           </a:p>
@@ -2077,7 +2078,7 @@
           <a:p>
             <a:fld id="{B13D75DC-8E41-4047-8660-F48B31ADAB0C}" type="datetimeFigureOut">
               <a:rPr lang="fr-FR" smtClean="0"/>
-              <a:t>21/03/2020</a:t>
+              <a:t>31/03/2020</a:t>
             </a:fld>
             <a:endParaRPr lang="fr-FR"/>
           </a:p>
@@ -2388,7 +2389,7 @@
           <a:p>
             <a:fld id="{B13D75DC-8E41-4047-8660-F48B31ADAB0C}" type="datetimeFigureOut">
               <a:rPr lang="fr-FR" smtClean="0"/>
-              <a:t>21/03/2020</a:t>
+              <a:t>31/03/2020</a:t>
             </a:fld>
             <a:endParaRPr lang="fr-FR"/>
           </a:p>
@@ -2676,7 +2677,7 @@
           <a:p>
             <a:fld id="{B13D75DC-8E41-4047-8660-F48B31ADAB0C}" type="datetimeFigureOut">
               <a:rPr lang="fr-FR" smtClean="0"/>
-              <a:t>21/03/2020</a:t>
+              <a:t>31/03/2020</a:t>
             </a:fld>
             <a:endParaRPr lang="fr-FR"/>
           </a:p>
@@ -2917,7 +2918,7 @@
           <a:p>
             <a:fld id="{B13D75DC-8E41-4047-8660-F48B31ADAB0C}" type="datetimeFigureOut">
               <a:rPr lang="fr-FR" smtClean="0"/>
-              <a:t>21/03/2020</a:t>
+              <a:t>31/03/2020</a:t>
             </a:fld>
             <a:endParaRPr lang="fr-FR"/>
           </a:p>
@@ -4428,6 +4429,151 @@
 </p:sld>
 </file>
 
+<file path=ppt/slides/slide2.xml><?xml version="1.0" encoding="utf-8"?>
+<p:sld xmlns:a="http://schemas.openxmlformats.org/drawingml/2006/main" xmlns:r="http://schemas.openxmlformats.org/officeDocument/2006/relationships" xmlns:p="http://schemas.openxmlformats.org/presentationml/2006/main">
+  <p:cSld>
+    <p:spTree>
+      <p:nvGrpSpPr>
+        <p:cNvPr id="1" name=""/>
+        <p:cNvGrpSpPr/>
+        <p:nvPr/>
+      </p:nvGrpSpPr>
+      <p:grpSpPr>
+        <a:xfrm>
+          <a:off x="0" y="0"/>
+          <a:ext cx="0" cy="0"/>
+          <a:chOff x="0" y="0"/>
+          <a:chExt cx="0" cy="0"/>
+        </a:xfrm>
+      </p:grpSpPr>
+      <p:grpSp>
+        <p:nvGrpSpPr>
+          <p:cNvPr id="6" name="Groupe 5">
+            <a:extLst>
+              <a:ext uri="{FF2B5EF4-FFF2-40B4-BE49-F238E27FC236}">
+                <a16:creationId xmlns:a16="http://schemas.microsoft.com/office/drawing/2014/main" id="{6C2C63E4-8464-4EA8-9C7F-0CC0474C9340}"/>
+              </a:ext>
+            </a:extLst>
+          </p:cNvPr>
+          <p:cNvGrpSpPr/>
+          <p:nvPr/>
+        </p:nvGrpSpPr>
+        <p:grpSpPr>
+          <a:xfrm>
+            <a:off x="7312425" y="-206857"/>
+            <a:ext cx="2948400" cy="7271714"/>
+            <a:chOff x="4345483" y="219076"/>
+            <a:chExt cx="2948400" cy="7271714"/>
+          </a:xfrm>
+        </p:grpSpPr>
+        <p:pic>
+          <p:nvPicPr>
+            <p:cNvPr id="4" name="Image 3">
+              <a:extLst>
+                <a:ext uri="{FF2B5EF4-FFF2-40B4-BE49-F238E27FC236}">
+                  <a16:creationId xmlns:a16="http://schemas.microsoft.com/office/drawing/2014/main" id="{550BAD8C-E2C3-4FBB-81D3-1F2C1792A140}"/>
+                </a:ext>
+              </a:extLst>
+            </p:cNvPr>
+            <p:cNvPicPr>
+              <a:picLocks noChangeAspect="1"/>
+            </p:cNvPicPr>
+            <p:nvPr/>
+          </p:nvPicPr>
+          <p:blipFill rotWithShape="1">
+            <a:blip r:embed="rId2"/>
+            <a:srcRect t="13333" r="3627" b="928"/>
+            <a:stretch/>
+          </p:blipFill>
+          <p:spPr>
+            <a:xfrm>
+              <a:off x="4345483" y="219076"/>
+              <a:ext cx="2948076" cy="4400550"/>
+            </a:xfrm>
+            <a:prstGeom prst="rect">
+              <a:avLst/>
+            </a:prstGeom>
+          </p:spPr>
+        </p:pic>
+        <p:pic>
+          <p:nvPicPr>
+            <p:cNvPr id="5" name="Image 4">
+              <a:extLst>
+                <a:ext uri="{FF2B5EF4-FFF2-40B4-BE49-F238E27FC236}">
+                  <a16:creationId xmlns:a16="http://schemas.microsoft.com/office/drawing/2014/main" id="{D402DEAD-B1D4-45F8-A260-12EEB1E3685C}"/>
+                </a:ext>
+              </a:extLst>
+            </p:cNvPr>
+            <p:cNvPicPr>
+              <a:picLocks noChangeAspect="1"/>
+            </p:cNvPicPr>
+            <p:nvPr/>
+          </p:nvPicPr>
+          <p:blipFill rotWithShape="1">
+            <a:blip r:embed="rId3"/>
+            <a:srcRect t="16998" r="3626" b="903"/>
+            <a:stretch/>
+          </p:blipFill>
+          <p:spPr>
+            <a:xfrm>
+              <a:off x="4345483" y="3276600"/>
+              <a:ext cx="2948400" cy="4214190"/>
+            </a:xfrm>
+            <a:prstGeom prst="rect">
+              <a:avLst/>
+            </a:prstGeom>
+          </p:spPr>
+        </p:pic>
+      </p:grpSp>
+      <p:pic>
+        <p:nvPicPr>
+          <p:cNvPr id="8" name="Image 7" descr="Une image contenant capture d’écran&#10;&#10;Description générée automatiquement">
+            <a:extLst>
+              <a:ext uri="{FF2B5EF4-FFF2-40B4-BE49-F238E27FC236}">
+                <a16:creationId xmlns:a16="http://schemas.microsoft.com/office/drawing/2014/main" id="{5A8EF3E5-95DA-4790-91E5-F5E0A25583D5}"/>
+              </a:ext>
+            </a:extLst>
+          </p:cNvPr>
+          <p:cNvPicPr>
+            <a:picLocks noChangeAspect="1"/>
+          </p:cNvPicPr>
+          <p:nvPr/>
+        </p:nvPicPr>
+        <p:blipFill>
+          <a:blip r:embed="rId4">
+            <a:extLst>
+              <a:ext uri="{28A0092B-C50C-407E-A947-70E740481C1C}">
+                <a14:useLocalDpi xmlns:a14="http://schemas.microsoft.com/office/drawing/2010/main" val="0"/>
+              </a:ext>
+            </a:extLst>
+          </a:blip>
+          <a:stretch>
+            <a:fillRect/>
+          </a:stretch>
+        </p:blipFill>
+        <p:spPr>
+          <a:xfrm>
+            <a:off x="1931175" y="0"/>
+            <a:ext cx="2782290" cy="6858000"/>
+          </a:xfrm>
+          <a:prstGeom prst="rect">
+            <a:avLst/>
+          </a:prstGeom>
+        </p:spPr>
+      </p:pic>
+    </p:spTree>
+    <p:extLst>
+      <p:ext uri="{BB962C8B-B14F-4D97-AF65-F5344CB8AC3E}">
+        <p14:creationId xmlns:p14="http://schemas.microsoft.com/office/powerpoint/2010/main" val="2464617602"/>
+      </p:ext>
+    </p:extLst>
+  </p:cSld>
+  <p:clrMapOvr>
+    <a:masterClrMapping/>
+  </p:clrMapOvr>
+</p:sld>
+</file>
+
 <file path=ppt/theme/theme1.xml><?xml version="1.0" encoding="utf-8"?>
 <a:theme xmlns:a="http://schemas.openxmlformats.org/drawingml/2006/main" name="Thème Office">
   <a:themeElements>

</xml_diff>